<commit_message>
Refactorizar codigo para arquitectura MVC
</commit_message>
<xml_diff>
--- a/output.pptx
+++ b/output.pptx
@@ -3108,7 +3108,7 @@
           <a:lstStyle/>
           <a:p>
             <a:r>
-              <a:t>Definición de Internet</a:t>
+              <a:t>Definición de Venado</a:t>
             </a:r>
           </a:p>
         </p:txBody>
@@ -3153,7 +3153,7 @@
           <a:lstStyle/>
           <a:p>
             <a:r>
-              <a:t>Internet es una red de computadoras interconectadas a través de un protocolo de comunicación con el fin de compartir información.</a:t>
+              <a:t>Los venados son animales majestuosos que habitan en diversas regiones del mundo.</a:t>
             </a:r>
           </a:p>
         </p:txBody>
@@ -3216,7 +3216,7 @@
           <a:lstStyle/>
           <a:p>
             <a:r>
-              <a:t>Usos de Internet</a:t>
+              <a:t>Características del Venado</a:t>
             </a:r>
           </a:p>
         </p:txBody>
@@ -3261,35 +3261,11 @@
           <a:lstStyle/>
           <a:p>
             <a:r>
-              <a:t>Internet se utiliza para una variedad de cosas, desde comprar en línea hasta transmitir contenido multimedia.</a:t>
-            </a:r>
-          </a:p>
-        </p:txBody>
-      </p:sp>
-      <p:pic>
-        <p:nvPicPr>
-          <p:cNvPr id="5" name="Picture 4" descr="temp.jpg"/>
-          <p:cNvPicPr>
-            <a:picLocks noChangeAspect="1"/>
-          </p:cNvPicPr>
-          <p:nvPr/>
-        </p:nvPicPr>
-        <p:blipFill>
-          <a:blip r:embed="rId2"/>
-          <a:stretch>
-            <a:fillRect/>
-          </a:stretch>
-        </p:blipFill>
-        <p:spPr>
-          <a:xfrm>
-            <a:off x="1828800" y="2743200"/>
-            <a:ext cx="5486400" cy="3657600"/>
-          </a:xfrm>
-          <a:prstGeom prst="rect">
-            <a:avLst/>
-          </a:prstGeom>
-        </p:spPr>
-      </p:pic>
+              <a:t>Existen diferentes especies de venados, cada una con características únicas.</a:t>
+            </a:r>
+          </a:p>
+        </p:txBody>
+      </p:sp>
     </p:spTree>
   </p:cSld>
   <p:clrMapOvr>
@@ -3324,7 +3300,7 @@
           <a:lstStyle/>
           <a:p>
             <a:r>
-              <a:t>Internet y la Sociedad</a:t>
+              <a:t>Cuernos Ramificados del Venado</a:t>
             </a:r>
           </a:p>
         </p:txBody>
@@ -3369,7 +3345,7 @@
           <a:lstStyle/>
           <a:p>
             <a:r>
-              <a:t>Internet ha cambiado drásticamente la forma en que interactuamos y nos comunicamos.</a:t>
+              <a:t>Los venados poseen cuernos ramificados que son utilizados para la competencia y atracción de parejas.</a:t>
             </a:r>
           </a:p>
         </p:txBody>
@@ -3432,7 +3408,7 @@
           <a:lstStyle/>
           <a:p>
             <a:r>
-              <a:t>Seguridad en Internet</a:t>
+              <a:t>Hábitats del Venado</a:t>
             </a:r>
           </a:p>
         </p:txBody>
@@ -3477,7 +3453,7 @@
           <a:lstStyle/>
           <a:p>
             <a:r>
-              <a:t>Es importante tener en cuenta la seguridad en línea al navegar por la web, especialmente al proporcionar información personal.</a:t>
+              <a:t>Los venados se adaptan a diferentes hábitats, desde bosques hasta praderas y montañas.</a:t>
             </a:r>
           </a:p>
         </p:txBody>
@@ -3540,7 +3516,7 @@
           <a:lstStyle/>
           <a:p>
             <a:r>
-              <a:t>El Futuro de Internet</a:t>
+              <a:t>Importancia de la Conservación del Venado</a:t>
             </a:r>
           </a:p>
         </p:txBody>
@@ -3585,7 +3561,7 @@
           <a:lstStyle/>
           <a:p>
             <a:r>
-              <a:t>El futuro de Internet se ve prometedor, con nuevas tecnologías que permitirán una conexión más rápida y segura.</a:t>
+              <a:t>La conservación de los venados es crucial para preservar la biodiversidad y el equilibrio de los ecosistemas.</a:t>
             </a:r>
           </a:p>
         </p:txBody>

</xml_diff>